<commit_message>
Finished slides for effective presentations
</commit_message>
<xml_diff>
--- a/Documents/Slides/Effective Presentations.pptx
+++ b/Documents/Slides/Effective Presentations.pptx
@@ -7725,8 +7725,8 @@
             <a:defRPr cap="all"/>
           </a:pPr>
           <a:r>
-            <a:rPr lang="en-US"/>
-            <a:t>Strong start (hook + purpose)</a:t>
+            <a:rPr lang="en-US" dirty="0"/>
+            <a:t>Strong start</a:t>
           </a:r>
         </a:p>
       </dgm:t>
@@ -7764,8 +7764,8 @@
             <a:defRPr cap="all"/>
           </a:pPr>
           <a:r>
-            <a:rPr lang="en-US"/>
-            <a:t>Clear middle (focus on 3-5 main points/arguments)</a:t>
+            <a:rPr lang="en-US" dirty="0"/>
+            <a:t>Clear middle</a:t>
           </a:r>
         </a:p>
       </dgm:t>
@@ -8724,10 +8724,9 @@
             <a:defRPr cap="all"/>
           </a:pPr>
           <a:r>
-            <a:rPr lang="en-US" u="sng"/>
+            <a:rPr lang="en-US" u="none" dirty="0"/>
             <a:t>One idea per slide </a:t>
           </a:r>
-          <a:endParaRPr lang="en-US"/>
         </a:p>
       </dgm:t>
     </dgm:pt>
@@ -10951,7 +10950,7 @@
         </a:bodyPr>
         <a:lstStyle/>
         <a:p>
-          <a:pPr marL="0" lvl="0" indent="0" algn="ctr" defTabSz="844550">
+          <a:pPr marL="0" lvl="0" indent="0" algn="ctr" defTabSz="1155700">
             <a:lnSpc>
               <a:spcPct val="90000"/>
             </a:lnSpc>
@@ -10965,8 +10964,8 @@
             <a:defRPr cap="all"/>
           </a:pPr>
           <a:r>
-            <a:rPr lang="en-US" sz="1900" kern="1200"/>
-            <a:t>Strong start (hook + purpose)</a:t>
+            <a:rPr lang="en-US" sz="2600" kern="1200" dirty="0"/>
+            <a:t>Strong start</a:t>
           </a:r>
         </a:p>
       </dsp:txBody>
@@ -11101,7 +11100,7 @@
         </a:bodyPr>
         <a:lstStyle/>
         <a:p>
-          <a:pPr marL="0" lvl="0" indent="0" algn="ctr" defTabSz="844550">
+          <a:pPr marL="0" lvl="0" indent="0" algn="ctr" defTabSz="1155700">
             <a:lnSpc>
               <a:spcPct val="90000"/>
             </a:lnSpc>
@@ -11115,8 +11114,8 @@
             <a:defRPr cap="all"/>
           </a:pPr>
           <a:r>
-            <a:rPr lang="en-US" sz="1900" kern="1200"/>
-            <a:t>Clear middle (focus on 3-5 main points/arguments)</a:t>
+            <a:rPr lang="en-US" sz="2600" kern="1200" dirty="0"/>
+            <a:t>Clear middle</a:t>
           </a:r>
         </a:p>
       </dsp:txBody>
@@ -11251,7 +11250,7 @@
         </a:bodyPr>
         <a:lstStyle/>
         <a:p>
-          <a:pPr marL="0" lvl="0" indent="0" algn="ctr" defTabSz="844550">
+          <a:pPr marL="0" lvl="0" indent="0" algn="ctr" defTabSz="1155700">
             <a:lnSpc>
               <a:spcPct val="90000"/>
             </a:lnSpc>
@@ -11265,7 +11264,7 @@
             <a:defRPr cap="all"/>
           </a:pPr>
           <a:r>
-            <a:rPr lang="en-US" sz="1900" kern="1200"/>
+            <a:rPr lang="en-US" sz="2600" kern="1200"/>
             <a:t>Memorable ending</a:t>
           </a:r>
         </a:p>
@@ -12285,10 +12284,9 @@
             <a:defRPr cap="all"/>
           </a:pPr>
           <a:r>
-            <a:rPr lang="en-US" sz="2500" u="sng" kern="1200"/>
+            <a:rPr lang="en-US" sz="2500" u="none" kern="1200" dirty="0"/>
             <a:t>One idea per slide </a:t>
           </a:r>
-          <a:endParaRPr lang="en-US" sz="2500" kern="1200"/>
         </a:p>
       </dsp:txBody>
       <dsp:txXfrm>
@@ -23955,7 +23953,7 @@
           <a:p>
             <a:fld id="{2EA7C0C5-2125-494E-AA77-0B10FFEE1FF7}" type="datetimeFigureOut">
               <a:rPr lang="en-US" smtClean="0"/>
-              <a:t>6/25/25</a:t>
+              <a:t>6/26/25</a:t>
             </a:fld>
             <a:endParaRPr lang="en-US"/>
           </a:p>
@@ -24667,7 +24665,7 @@
           <a:p>
             <a:fld id="{38E3A72C-6242-744D-A06E-0C8359AED0AB}" type="datetimeFigureOut">
               <a:rPr lang="en-US" smtClean="0"/>
-              <a:t>6/25/25</a:t>
+              <a:t>6/26/25</a:t>
             </a:fld>
             <a:endParaRPr lang="en-US"/>
           </a:p>
@@ -24865,7 +24863,7 @@
           <a:p>
             <a:fld id="{38E3A72C-6242-744D-A06E-0C8359AED0AB}" type="datetimeFigureOut">
               <a:rPr lang="en-US" smtClean="0"/>
-              <a:t>6/25/25</a:t>
+              <a:t>6/26/25</a:t>
             </a:fld>
             <a:endParaRPr lang="en-US"/>
           </a:p>
@@ -25073,7 +25071,7 @@
           <a:p>
             <a:fld id="{38E3A72C-6242-744D-A06E-0C8359AED0AB}" type="datetimeFigureOut">
               <a:rPr lang="en-US" smtClean="0"/>
-              <a:t>6/25/25</a:t>
+              <a:t>6/26/25</a:t>
             </a:fld>
             <a:endParaRPr lang="en-US"/>
           </a:p>
@@ -25271,7 +25269,7 @@
           <a:p>
             <a:fld id="{38E3A72C-6242-744D-A06E-0C8359AED0AB}" type="datetimeFigureOut">
               <a:rPr lang="en-US" smtClean="0"/>
-              <a:t>6/25/25</a:t>
+              <a:t>6/26/25</a:t>
             </a:fld>
             <a:endParaRPr lang="en-US"/>
           </a:p>
@@ -25546,7 +25544,7 @@
           <a:p>
             <a:fld id="{38E3A72C-6242-744D-A06E-0C8359AED0AB}" type="datetimeFigureOut">
               <a:rPr lang="en-US" smtClean="0"/>
-              <a:t>6/25/25</a:t>
+              <a:t>6/26/25</a:t>
             </a:fld>
             <a:endParaRPr lang="en-US"/>
           </a:p>
@@ -25811,7 +25809,7 @@
           <a:p>
             <a:fld id="{38E3A72C-6242-744D-A06E-0C8359AED0AB}" type="datetimeFigureOut">
               <a:rPr lang="en-US" smtClean="0"/>
-              <a:t>6/25/25</a:t>
+              <a:t>6/26/25</a:t>
             </a:fld>
             <a:endParaRPr lang="en-US"/>
           </a:p>
@@ -26223,7 +26221,7 @@
           <a:p>
             <a:fld id="{38E3A72C-6242-744D-A06E-0C8359AED0AB}" type="datetimeFigureOut">
               <a:rPr lang="en-US" smtClean="0"/>
-              <a:t>6/25/25</a:t>
+              <a:t>6/26/25</a:t>
             </a:fld>
             <a:endParaRPr lang="en-US"/>
           </a:p>
@@ -26364,7 +26362,7 @@
           <a:p>
             <a:fld id="{38E3A72C-6242-744D-A06E-0C8359AED0AB}" type="datetimeFigureOut">
               <a:rPr lang="en-US" smtClean="0"/>
-              <a:t>6/25/25</a:t>
+              <a:t>6/26/25</a:t>
             </a:fld>
             <a:endParaRPr lang="en-US"/>
           </a:p>
@@ -26477,7 +26475,7 @@
           <a:p>
             <a:fld id="{38E3A72C-6242-744D-A06E-0C8359AED0AB}" type="datetimeFigureOut">
               <a:rPr lang="en-US" smtClean="0"/>
-              <a:t>6/25/25</a:t>
+              <a:t>6/26/25</a:t>
             </a:fld>
             <a:endParaRPr lang="en-US"/>
           </a:p>
@@ -26788,7 +26786,7 @@
           <a:p>
             <a:fld id="{38E3A72C-6242-744D-A06E-0C8359AED0AB}" type="datetimeFigureOut">
               <a:rPr lang="en-US" smtClean="0"/>
-              <a:t>6/25/25</a:t>
+              <a:t>6/26/25</a:t>
             </a:fld>
             <a:endParaRPr lang="en-US"/>
           </a:p>
@@ -27076,7 +27074,7 @@
           <a:p>
             <a:fld id="{38E3A72C-6242-744D-A06E-0C8359AED0AB}" type="datetimeFigureOut">
               <a:rPr lang="en-US" smtClean="0"/>
-              <a:t>6/25/25</a:t>
+              <a:t>6/26/25</a:t>
             </a:fld>
             <a:endParaRPr lang="en-US"/>
           </a:p>
@@ -27317,7 +27315,7 @@
           <a:p>
             <a:fld id="{38E3A72C-6242-744D-A06E-0C8359AED0AB}" type="datetimeFigureOut">
               <a:rPr lang="en-US" smtClean="0"/>
-              <a:t>6/25/25</a:t>
+              <a:t>6/26/25</a:t>
             </a:fld>
             <a:endParaRPr lang="en-US"/>
           </a:p>
@@ -32610,9 +32608,30 @@
             <a:pPr marL="457200" lvl="1" indent="0">
               <a:buNone/>
             </a:pPr>
+            <a:endParaRPr lang="en-US" dirty="0"/>
+          </a:p>
+          <a:p>
+            <a:pPr marL="457200" lvl="1" indent="0">
+              <a:buNone/>
+            </a:pPr>
+            <a:endParaRPr lang="en-US" dirty="0"/>
+          </a:p>
+          <a:p>
+            <a:pPr marL="457200" lvl="1" indent="0">
+              <a:buNone/>
+            </a:pPr>
             <a:r>
               <a:rPr lang="en-US" dirty="0"/>
-              <a:t>I study _____________________________________________  </a:t>
+              <a:t>I am _________________________________________________,</a:t>
+            </a:r>
+          </a:p>
+          <a:p>
+            <a:pPr marL="457200" lvl="1" indent="0">
+              <a:buNone/>
+            </a:pPr>
+            <a:r>
+              <a:rPr lang="en-US" dirty="0"/>
+              <a:t>And I study ___________________________________________,</a:t>
             </a:r>
           </a:p>
           <a:p>
@@ -32923,7 +32942,7 @@
             <p:ph idx="1"/>
             <p:extLst>
               <p:ext uri="{D42A27DB-BD31-4B8C-83A1-F6EECF244321}">
-                <p14:modId xmlns:p14="http://schemas.microsoft.com/office/powerpoint/2010/main" val="1316949681"/>
+                <p14:modId xmlns:p14="http://schemas.microsoft.com/office/powerpoint/2010/main" val="2992187228"/>
               </p:ext>
             </p:extLst>
           </p:nvPr>
@@ -33472,7 +33491,7 @@
             <p:ph idx="1"/>
             <p:extLst>
               <p:ext uri="{D42A27DB-BD31-4B8C-83A1-F6EECF244321}">
-                <p14:modId xmlns:p14="http://schemas.microsoft.com/office/powerpoint/2010/main" val="762783731"/>
+                <p14:modId xmlns:p14="http://schemas.microsoft.com/office/powerpoint/2010/main" val="4243495797"/>
               </p:ext>
             </p:extLst>
           </p:nvPr>

</xml_diff>